<commit_message>
Updating powerpoints and adding directories
</commit_message>
<xml_diff>
--- a/08262022_Presentation.pptx
+++ b/08262022_Presentation.pptx
@@ -8,6 +8,9 @@
     <p:sldId id="256" r:id="rId2"/>
     <p:sldId id="257" r:id="rId3"/>
     <p:sldId id="258" r:id="rId4"/>
+    <p:sldId id="261" r:id="rId5"/>
+    <p:sldId id="259" r:id="rId6"/>
+    <p:sldId id="260" r:id="rId7"/>
   </p:sldIdLst>
   <p:sldSz cx="12192000" cy="6858000"/>
   <p:notesSz cx="6858000" cy="9144000"/>
@@ -284,7 +287,7 @@
           <a:p>
             <a:fld id="{364EF15B-D387-DC4B-B0C1-05FE8AC02CCA}" type="datetimeFigureOut">
               <a:rPr lang="en-US" smtClean="0"/>
-              <a:t>8/21/22</a:t>
+              <a:t>8/22/22</a:t>
             </a:fld>
             <a:endParaRPr lang="en-US"/>
           </a:p>
@@ -551,7 +554,7 @@
           <a:p>
             <a:fld id="{364EF15B-D387-DC4B-B0C1-05FE8AC02CCA}" type="datetimeFigureOut">
               <a:rPr lang="en-US" smtClean="0"/>
-              <a:t>8/21/22</a:t>
+              <a:t>8/22/22</a:t>
             </a:fld>
             <a:endParaRPr lang="en-US"/>
           </a:p>
@@ -782,7 +785,7 @@
           <a:p>
             <a:fld id="{364EF15B-D387-DC4B-B0C1-05FE8AC02CCA}" type="datetimeFigureOut">
               <a:rPr lang="en-US" smtClean="0"/>
-              <a:t>8/21/22</a:t>
+              <a:t>8/22/22</a:t>
             </a:fld>
             <a:endParaRPr lang="en-US"/>
           </a:p>
@@ -1092,7 +1095,7 @@
           <a:p>
             <a:fld id="{364EF15B-D387-DC4B-B0C1-05FE8AC02CCA}" type="datetimeFigureOut">
               <a:rPr lang="en-US" smtClean="0"/>
-              <a:t>8/21/22</a:t>
+              <a:t>8/22/22</a:t>
             </a:fld>
             <a:endParaRPr lang="en-US"/>
           </a:p>
@@ -1565,7 +1568,7 @@
           <a:p>
             <a:fld id="{364EF15B-D387-DC4B-B0C1-05FE8AC02CCA}" type="datetimeFigureOut">
               <a:rPr lang="en-US" smtClean="0"/>
-              <a:t>8/21/22</a:t>
+              <a:t>8/22/22</a:t>
             </a:fld>
             <a:endParaRPr lang="en-US"/>
           </a:p>
@@ -2112,7 +2115,7 @@
           <a:p>
             <a:fld id="{364EF15B-D387-DC4B-B0C1-05FE8AC02CCA}" type="datetimeFigureOut">
               <a:rPr lang="en-US" smtClean="0"/>
-              <a:t>8/21/22</a:t>
+              <a:t>8/22/22</a:t>
             </a:fld>
             <a:endParaRPr lang="en-US"/>
           </a:p>
@@ -2886,7 +2889,7 @@
           <a:p>
             <a:fld id="{364EF15B-D387-DC4B-B0C1-05FE8AC02CCA}" type="datetimeFigureOut">
               <a:rPr lang="en-US" smtClean="0"/>
-              <a:t>8/21/22</a:t>
+              <a:t>8/22/22</a:t>
             </a:fld>
             <a:endParaRPr lang="en-US"/>
           </a:p>
@@ -3061,7 +3064,7 @@
           <a:p>
             <a:fld id="{364EF15B-D387-DC4B-B0C1-05FE8AC02CCA}" type="datetimeFigureOut">
               <a:rPr lang="en-US" smtClean="0"/>
-              <a:t>8/21/22</a:t>
+              <a:t>8/22/22</a:t>
             </a:fld>
             <a:endParaRPr lang="en-US"/>
           </a:p>
@@ -3284,7 +3287,7 @@
           <a:p>
             <a:fld id="{364EF15B-D387-DC4B-B0C1-05FE8AC02CCA}" type="datetimeFigureOut">
               <a:rPr lang="en-US" smtClean="0"/>
-              <a:t>8/21/22</a:t>
+              <a:t>8/22/22</a:t>
             </a:fld>
             <a:endParaRPr lang="en-US"/>
           </a:p>
@@ -3464,7 +3467,7 @@
           <a:p>
             <a:fld id="{364EF15B-D387-DC4B-B0C1-05FE8AC02CCA}" type="datetimeFigureOut">
               <a:rPr lang="en-US" smtClean="0"/>
-              <a:t>8/21/22</a:t>
+              <a:t>8/22/22</a:t>
             </a:fld>
             <a:endParaRPr lang="en-US"/>
           </a:p>
@@ -3753,7 +3756,7 @@
           <a:p>
             <a:fld id="{364EF15B-D387-DC4B-B0C1-05FE8AC02CCA}" type="datetimeFigureOut">
               <a:rPr lang="en-US" smtClean="0"/>
-              <a:t>8/21/22</a:t>
+              <a:t>8/22/22</a:t>
             </a:fld>
             <a:endParaRPr lang="en-US"/>
           </a:p>
@@ -3995,7 +3998,7 @@
           <a:p>
             <a:fld id="{364EF15B-D387-DC4B-B0C1-05FE8AC02CCA}" type="datetimeFigureOut">
               <a:rPr lang="en-US" smtClean="0"/>
-              <a:t>8/21/22</a:t>
+              <a:t>8/22/22</a:t>
             </a:fld>
             <a:endParaRPr lang="en-US"/>
           </a:p>
@@ -4374,7 +4377,7 @@
           <a:p>
             <a:fld id="{364EF15B-D387-DC4B-B0C1-05FE8AC02CCA}" type="datetimeFigureOut">
               <a:rPr lang="en-US" smtClean="0"/>
-              <a:t>8/21/22</a:t>
+              <a:t>8/22/22</a:t>
             </a:fld>
             <a:endParaRPr lang="en-US"/>
           </a:p>
@@ -4492,7 +4495,7 @@
           <a:p>
             <a:fld id="{364EF15B-D387-DC4B-B0C1-05FE8AC02CCA}" type="datetimeFigureOut">
               <a:rPr lang="en-US" smtClean="0"/>
-              <a:t>8/21/22</a:t>
+              <a:t>8/22/22</a:t>
             </a:fld>
             <a:endParaRPr lang="en-US"/>
           </a:p>
@@ -4587,7 +4590,7 @@
           <a:p>
             <a:fld id="{364EF15B-D387-DC4B-B0C1-05FE8AC02CCA}" type="datetimeFigureOut">
               <a:rPr lang="en-US" smtClean="0"/>
-              <a:t>8/21/22</a:t>
+              <a:t>8/22/22</a:t>
             </a:fld>
             <a:endParaRPr lang="en-US"/>
           </a:p>
@@ -4836,7 +4839,7 @@
           <a:p>
             <a:fld id="{364EF15B-D387-DC4B-B0C1-05FE8AC02CCA}" type="datetimeFigureOut">
               <a:rPr lang="en-US" smtClean="0"/>
-              <a:t>8/21/22</a:t>
+              <a:t>8/22/22</a:t>
             </a:fld>
             <a:endParaRPr lang="en-US"/>
           </a:p>
@@ -5093,7 +5096,7 @@
           <a:p>
             <a:fld id="{364EF15B-D387-DC4B-B0C1-05FE8AC02CCA}" type="datetimeFigureOut">
               <a:rPr lang="en-US" smtClean="0"/>
-              <a:t>8/21/22</a:t>
+              <a:t>8/22/22</a:t>
             </a:fld>
             <a:endParaRPr lang="en-US"/>
           </a:p>
@@ -5336,7 +5339,7 @@
           <a:p>
             <a:fld id="{364EF15B-D387-DC4B-B0C1-05FE8AC02CCA}" type="datetimeFigureOut">
               <a:rPr lang="en-US" smtClean="0"/>
-              <a:t>8/21/22</a:t>
+              <a:t>8/22/22</a:t>
             </a:fld>
             <a:endParaRPr lang="en-US"/>
           </a:p>
@@ -5885,7 +5888,7 @@
         <p:spPr/>
         <p:txBody>
           <a:bodyPr>
-            <a:normAutofit lnSpcReduction="10000"/>
+            <a:normAutofit fontScale="85000" lnSpcReduction="20000"/>
           </a:bodyPr>
           <a:lstStyle/>
           <a:p>
@@ -5906,7 +5909,39 @@
               <a:rPr lang="en-US" dirty="0"/>
               <a:t>Finish Z_0 calculation</a:t>
             </a:r>
+          </a:p>
+          <a:p>
+            <a:pPr lvl="1"/>
+            <a:r>
+              <a:rPr lang="en-US" sz="1700" dirty="0"/>
+              <a:t>Finished and implemented</a:t>
+            </a:r>
+          </a:p>
+          <a:p>
+            <a:r>
+              <a:rPr lang="en-US" sz="1900" dirty="0"/>
+              <a:t>Modify the </a:t>
+            </a:r>
+            <a:r>
+              <a:rPr lang="en-US" sz="1900" dirty="0" err="1"/>
+              <a:t>input_sounding</a:t>
+            </a:r>
             <a:endParaRPr lang="en-US" sz="1900" dirty="0"/>
+          </a:p>
+          <a:p>
+            <a:pPr lvl="1"/>
+            <a:r>
+              <a:rPr lang="en-US" sz="1900" dirty="0"/>
+              <a:t>Verify the </a:t>
+            </a:r>
+            <a:r>
+              <a:rPr lang="en-US" sz="1900" dirty="0" err="1"/>
+              <a:t>wrfinput</a:t>
+            </a:r>
+            <a:r>
+              <a:rPr lang="en-US" sz="1900" dirty="0"/>
+              <a:t> file</a:t>
+            </a:r>
           </a:p>
           <a:p>
             <a:r>
@@ -5930,29 +5965,10 @@
             </a:r>
           </a:p>
           <a:p>
+            <a:pPr lvl="1"/>
             <a:r>
               <a:rPr lang="en-US" sz="1900" dirty="0"/>
-              <a:t>Modify the </a:t>
-            </a:r>
-            <a:r>
-              <a:rPr lang="en-US" sz="1900" dirty="0" err="1"/>
-              <a:t>input_sounding</a:t>
-            </a:r>
-            <a:endParaRPr lang="en-US" sz="1900" dirty="0"/>
-          </a:p>
-          <a:p>
-            <a:pPr lvl="1"/>
-            <a:r>
-              <a:rPr lang="en-US" sz="1900" dirty="0"/>
-              <a:t>Verify the </a:t>
-            </a:r>
-            <a:r>
-              <a:rPr lang="en-US" sz="1900" dirty="0" err="1"/>
-              <a:t>wrfinput</a:t>
-            </a:r>
-            <a:r>
-              <a:rPr lang="en-US" sz="1900" dirty="0"/>
-              <a:t> file</a:t>
+              <a:t>Waiting for z_0 calculation and modifying sounding</a:t>
             </a:r>
           </a:p>
           <a:p>
@@ -5973,6 +5989,13 @@
             <a:r>
               <a:rPr lang="en-US" sz="1900" dirty="0"/>
               <a:t> for Jan</a:t>
+            </a:r>
+          </a:p>
+          <a:p>
+            <a:pPr lvl="1"/>
+            <a:r>
+              <a:rPr lang="en-US" sz="1700" dirty="0"/>
+              <a:t>In progress and can be found at: </a:t>
             </a:r>
           </a:p>
           <a:p>
@@ -6168,6 +6191,452 @@
     <p:extLst>
       <p:ext uri="{BB962C8B-B14F-4D97-AF65-F5344CB8AC3E}">
         <p14:creationId xmlns:p14="http://schemas.microsoft.com/office/powerpoint/2010/main" val="898746892"/>
+      </p:ext>
+    </p:extLst>
+  </p:cSld>
+  <p:clrMapOvr>
+    <a:masterClrMapping/>
+  </p:clrMapOvr>
+</p:sld>
+</file>
+
+<file path=ppt/slides/slide4.xml><?xml version="1.0" encoding="utf-8"?>
+<p:sld xmlns:a="http://schemas.openxmlformats.org/drawingml/2006/main" xmlns:r="http://schemas.openxmlformats.org/officeDocument/2006/relationships" xmlns:p="http://schemas.openxmlformats.org/presentationml/2006/main">
+  <p:cSld>
+    <p:spTree>
+      <p:nvGrpSpPr>
+        <p:cNvPr id="1" name=""/>
+        <p:cNvGrpSpPr/>
+        <p:nvPr/>
+      </p:nvGrpSpPr>
+      <p:grpSpPr>
+        <a:xfrm>
+          <a:off x="0" y="0"/>
+          <a:ext cx="0" cy="0"/>
+          <a:chOff x="0" y="0"/>
+          <a:chExt cx="0" cy="0"/>
+        </a:xfrm>
+      </p:grpSpPr>
+      <p:sp>
+        <p:nvSpPr>
+          <p:cNvPr id="2" name="Title 1">
+            <a:extLst>
+              <a:ext uri="{FF2B5EF4-FFF2-40B4-BE49-F238E27FC236}">
+                <a16:creationId xmlns:a16="http://schemas.microsoft.com/office/drawing/2014/main" id="{D521358A-1AC1-E159-922F-D44E3F54DCD3}"/>
+              </a:ext>
+            </a:extLst>
+          </p:cNvPr>
+          <p:cNvSpPr>
+            <a:spLocks noGrp="1"/>
+          </p:cNvSpPr>
+          <p:nvPr>
+            <p:ph type="title"/>
+          </p:nvPr>
+        </p:nvSpPr>
+        <p:spPr/>
+        <p:txBody>
+          <a:bodyPr/>
+          <a:lstStyle/>
+          <a:p>
+            <a:r>
+              <a:rPr lang="en-US"/>
+              <a:t>Z_0 calculation</a:t>
+            </a:r>
+            <a:endParaRPr lang="en-US" dirty="0"/>
+          </a:p>
+        </p:txBody>
+      </p:sp>
+      <p:sp>
+        <p:nvSpPr>
+          <p:cNvPr id="3" name="Content Placeholder 2">
+            <a:extLst>
+              <a:ext uri="{FF2B5EF4-FFF2-40B4-BE49-F238E27FC236}">
+                <a16:creationId xmlns:a16="http://schemas.microsoft.com/office/drawing/2014/main" id="{DDE681CC-560A-FCB5-1309-44CBB5BBC934}"/>
+              </a:ext>
+            </a:extLst>
+          </p:cNvPr>
+          <p:cNvSpPr>
+            <a:spLocks noGrp="1"/>
+          </p:cNvSpPr>
+          <p:nvPr>
+            <p:ph idx="1"/>
+          </p:nvPr>
+        </p:nvSpPr>
+        <p:spPr/>
+        <p:txBody>
+          <a:bodyPr/>
+          <a:lstStyle/>
+          <a:p>
+            <a:r>
+              <a:rPr lang="en-US" dirty="0"/>
+              <a:t>Using the equation, I condensed the z_0 down to the line that fits the </a:t>
+            </a:r>
+            <a:r>
+              <a:rPr lang="en-US" dirty="0" err="1"/>
+              <a:t>input_sounding</a:t>
+            </a:r>
+            <a:r>
+              <a:rPr lang="en-US" dirty="0"/>
+              <a:t> profile the best</a:t>
+            </a:r>
+          </a:p>
+          <a:p>
+            <a:r>
+              <a:rPr lang="en-US" dirty="0"/>
+              <a:t>I added in my calculation as well</a:t>
+            </a:r>
+          </a:p>
+        </p:txBody>
+      </p:sp>
+      <p:pic>
+        <p:nvPicPr>
+          <p:cNvPr id="5" name="Picture 4">
+            <a:extLst>
+              <a:ext uri="{FF2B5EF4-FFF2-40B4-BE49-F238E27FC236}">
+                <a16:creationId xmlns:a16="http://schemas.microsoft.com/office/drawing/2014/main" id="{3057FCEC-BFF3-2419-6739-C7BB773B62F3}"/>
+              </a:ext>
+            </a:extLst>
+          </p:cNvPr>
+          <p:cNvPicPr>
+            <a:picLocks noChangeAspect="1"/>
+          </p:cNvPicPr>
+          <p:nvPr/>
+        </p:nvPicPr>
+        <p:blipFill>
+          <a:blip r:embed="rId2"/>
+          <a:stretch>
+            <a:fillRect/>
+          </a:stretch>
+        </p:blipFill>
+        <p:spPr>
+          <a:xfrm>
+            <a:off x="8167874" y="2833874"/>
+            <a:ext cx="4024126" cy="4024126"/>
+          </a:xfrm>
+          <a:prstGeom prst="rect">
+            <a:avLst/>
+          </a:prstGeom>
+        </p:spPr>
+      </p:pic>
+      <p:pic>
+        <p:nvPicPr>
+          <p:cNvPr id="6" name="Picture 5">
+            <a:extLst>
+              <a:ext uri="{FF2B5EF4-FFF2-40B4-BE49-F238E27FC236}">
+                <a16:creationId xmlns:a16="http://schemas.microsoft.com/office/drawing/2014/main" id="{A9B88DF3-9355-86E2-7053-CD2EE75D35C7}"/>
+              </a:ext>
+            </a:extLst>
+          </p:cNvPr>
+          <p:cNvPicPr>
+            <a:picLocks noChangeAspect="1"/>
+          </p:cNvPicPr>
+          <p:nvPr/>
+        </p:nvPicPr>
+        <p:blipFill>
+          <a:blip r:embed="rId3"/>
+          <a:stretch>
+            <a:fillRect/>
+          </a:stretch>
+        </p:blipFill>
+        <p:spPr>
+          <a:xfrm>
+            <a:off x="4024127" y="4584700"/>
+            <a:ext cx="4114800" cy="2273300"/>
+          </a:xfrm>
+          <a:prstGeom prst="rect">
+            <a:avLst/>
+          </a:prstGeom>
+        </p:spPr>
+      </p:pic>
+    </p:spTree>
+    <p:extLst>
+      <p:ext uri="{BB962C8B-B14F-4D97-AF65-F5344CB8AC3E}">
+        <p14:creationId xmlns:p14="http://schemas.microsoft.com/office/powerpoint/2010/main" val="786610475"/>
+      </p:ext>
+    </p:extLst>
+  </p:cSld>
+  <p:clrMapOvr>
+    <a:masterClrMapping/>
+  </p:clrMapOvr>
+</p:sld>
+</file>
+
+<file path=ppt/slides/slide5.xml><?xml version="1.0" encoding="utf-8"?>
+<p:sld xmlns:a="http://schemas.openxmlformats.org/drawingml/2006/main" xmlns:r="http://schemas.openxmlformats.org/officeDocument/2006/relationships" xmlns:p="http://schemas.openxmlformats.org/presentationml/2006/main">
+  <p:cSld>
+    <p:spTree>
+      <p:nvGrpSpPr>
+        <p:cNvPr id="1" name=""/>
+        <p:cNvGrpSpPr/>
+        <p:nvPr/>
+      </p:nvGrpSpPr>
+      <p:grpSpPr>
+        <a:xfrm>
+          <a:off x="0" y="0"/>
+          <a:ext cx="0" cy="0"/>
+          <a:chOff x="0" y="0"/>
+          <a:chExt cx="0" cy="0"/>
+        </a:xfrm>
+      </p:grpSpPr>
+      <p:sp>
+        <p:nvSpPr>
+          <p:cNvPr id="2" name="Title 1">
+            <a:extLst>
+              <a:ext uri="{FF2B5EF4-FFF2-40B4-BE49-F238E27FC236}">
+                <a16:creationId xmlns:a16="http://schemas.microsoft.com/office/drawing/2014/main" id="{F4F4E693-A3FB-DA43-7C23-337181B9F3B2}"/>
+              </a:ext>
+            </a:extLst>
+          </p:cNvPr>
+          <p:cNvSpPr>
+            <a:spLocks noGrp="1"/>
+          </p:cNvSpPr>
+          <p:nvPr>
+            <p:ph type="title"/>
+          </p:nvPr>
+        </p:nvSpPr>
+        <p:spPr/>
+        <p:txBody>
+          <a:bodyPr/>
+          <a:lstStyle/>
+          <a:p>
+            <a:r>
+              <a:rPr lang="en-US" dirty="0"/>
+              <a:t>Questions for Adam</a:t>
+            </a:r>
+          </a:p>
+        </p:txBody>
+      </p:sp>
+      <p:sp>
+        <p:nvSpPr>
+          <p:cNvPr id="3" name="Content Placeholder 2">
+            <a:extLst>
+              <a:ext uri="{FF2B5EF4-FFF2-40B4-BE49-F238E27FC236}">
+                <a16:creationId xmlns:a16="http://schemas.microsoft.com/office/drawing/2014/main" id="{45BF1ABA-5D95-9C3B-C94D-B7937AC34B2F}"/>
+              </a:ext>
+            </a:extLst>
+          </p:cNvPr>
+          <p:cNvSpPr>
+            <a:spLocks noGrp="1"/>
+          </p:cNvSpPr>
+          <p:nvPr>
+            <p:ph idx="1"/>
+          </p:nvPr>
+        </p:nvSpPr>
+        <p:spPr/>
+        <p:txBody>
+          <a:bodyPr/>
+          <a:lstStyle/>
+          <a:p>
+            <a:r>
+              <a:rPr lang="en-US" dirty="0"/>
+              <a:t>Show him excel sheet</a:t>
+            </a:r>
+          </a:p>
+          <a:p>
+            <a:r>
+              <a:rPr lang="en-US" dirty="0"/>
+              <a:t>Show him checking z_0 code /home/</a:t>
+            </a:r>
+            <a:r>
+              <a:rPr lang="en-US" dirty="0" err="1"/>
+              <a:t>jbenik</a:t>
+            </a:r>
+            <a:r>
+              <a:rPr lang="en-US" dirty="0"/>
+              <a:t>/FireFlux2/</a:t>
+            </a:r>
+            <a:r>
+              <a:rPr lang="en-US" dirty="0" err="1"/>
+              <a:t>Codes_and_Data</a:t>
+            </a:r>
+            <a:r>
+              <a:rPr lang="en-US" dirty="0"/>
+              <a:t>/Codes/</a:t>
+            </a:r>
+            <a:r>
+              <a:rPr lang="en-US" dirty="0" err="1"/>
+              <a:t>wrf_codes</a:t>
+            </a:r>
+            <a:r>
+              <a:rPr lang="en-US" dirty="0"/>
+              <a:t>/checking_z0.py</a:t>
+            </a:r>
+          </a:p>
+          <a:p>
+            <a:r>
+              <a:rPr lang="en-US" dirty="0"/>
+              <a:t>Show him my calculations (line 32 and 33)</a:t>
+            </a:r>
+          </a:p>
+          <a:p>
+            <a:r>
+              <a:rPr lang="en-US" dirty="0"/>
+              <a:t>Explain how I calculated z_0</a:t>
+            </a:r>
+          </a:p>
+          <a:p>
+            <a:r>
+              <a:rPr lang="en-US" dirty="0"/>
+              <a:t>Where do we go from here?</a:t>
+            </a:r>
+          </a:p>
+          <a:p>
+            <a:r>
+              <a:rPr lang="en-US" dirty="0"/>
+              <a:t>Should I run a new simulation with the base sounding since we have updated the z_0 in the winter section?</a:t>
+            </a:r>
+          </a:p>
+          <a:p>
+            <a:r>
+              <a:rPr lang="en-US" dirty="0"/>
+              <a:t>Should I change the z_0 since it seems like it’s hovering around 0.02?</a:t>
+            </a:r>
+          </a:p>
+        </p:txBody>
+      </p:sp>
+    </p:spTree>
+    <p:extLst>
+      <p:ext uri="{BB962C8B-B14F-4D97-AF65-F5344CB8AC3E}">
+        <p14:creationId xmlns:p14="http://schemas.microsoft.com/office/powerpoint/2010/main" val="1450573286"/>
+      </p:ext>
+    </p:extLst>
+  </p:cSld>
+  <p:clrMapOvr>
+    <a:masterClrMapping/>
+  </p:clrMapOvr>
+</p:sld>
+</file>
+
+<file path=ppt/slides/slide6.xml><?xml version="1.0" encoding="utf-8"?>
+<p:sld xmlns:a="http://schemas.openxmlformats.org/drawingml/2006/main" xmlns:r="http://schemas.openxmlformats.org/officeDocument/2006/relationships" xmlns:p="http://schemas.openxmlformats.org/presentationml/2006/main">
+  <p:cSld>
+    <p:spTree>
+      <p:nvGrpSpPr>
+        <p:cNvPr id="1" name=""/>
+        <p:cNvGrpSpPr/>
+        <p:nvPr/>
+      </p:nvGrpSpPr>
+      <p:grpSpPr>
+        <a:xfrm>
+          <a:off x="0" y="0"/>
+          <a:ext cx="0" cy="0"/>
+          <a:chOff x="0" y="0"/>
+          <a:chExt cx="0" cy="0"/>
+        </a:xfrm>
+      </p:grpSpPr>
+      <p:sp>
+        <p:nvSpPr>
+          <p:cNvPr id="2" name="Title 1">
+            <a:extLst>
+              <a:ext uri="{FF2B5EF4-FFF2-40B4-BE49-F238E27FC236}">
+                <a16:creationId xmlns:a16="http://schemas.microsoft.com/office/drawing/2014/main" id="{D6AC9072-83A3-AB7E-B06F-6B39AB642F74}"/>
+              </a:ext>
+            </a:extLst>
+          </p:cNvPr>
+          <p:cNvSpPr>
+            <a:spLocks noGrp="1"/>
+          </p:cNvSpPr>
+          <p:nvPr>
+            <p:ph type="title"/>
+          </p:nvPr>
+        </p:nvSpPr>
+        <p:spPr/>
+        <p:txBody>
+          <a:bodyPr/>
+          <a:lstStyle/>
+          <a:p>
+            <a:r>
+              <a:rPr lang="en-US" dirty="0"/>
+              <a:t>To do</a:t>
+            </a:r>
+          </a:p>
+        </p:txBody>
+      </p:sp>
+      <p:sp>
+        <p:nvSpPr>
+          <p:cNvPr id="3" name="Content Placeholder 2">
+            <a:extLst>
+              <a:ext uri="{FF2B5EF4-FFF2-40B4-BE49-F238E27FC236}">
+                <a16:creationId xmlns:a16="http://schemas.microsoft.com/office/drawing/2014/main" id="{4D1EEA56-4C07-F715-2DF2-73EC3F7E7897}"/>
+              </a:ext>
+            </a:extLst>
+          </p:cNvPr>
+          <p:cNvSpPr>
+            <a:spLocks noGrp="1"/>
+          </p:cNvSpPr>
+          <p:nvPr>
+            <p:ph idx="1"/>
+          </p:nvPr>
+        </p:nvSpPr>
+        <p:spPr/>
+        <p:txBody>
+          <a:bodyPr>
+            <a:normAutofit/>
+          </a:bodyPr>
+          <a:lstStyle/>
+          <a:p>
+            <a:r>
+              <a:rPr lang="en-US" sz="1900" dirty="0"/>
+              <a:t>Run the new sounding with open and cyclic boundary conditions</a:t>
+            </a:r>
+          </a:p>
+          <a:p>
+            <a:pPr lvl="1"/>
+            <a:r>
+              <a:rPr lang="en-US" sz="1900" dirty="0"/>
+              <a:t>Both </a:t>
+            </a:r>
+            <a:r>
+              <a:rPr lang="en-US" sz="1900" dirty="0" err="1"/>
+              <a:t>fire_atms</a:t>
+            </a:r>
+            <a:r>
+              <a:rPr lang="en-US" sz="1900" dirty="0"/>
+              <a:t> = 0</a:t>
+            </a:r>
+          </a:p>
+          <a:p>
+            <a:r>
+              <a:rPr lang="en-US" sz="2300" dirty="0"/>
+              <a:t>Interpolate pot. temperatures for the SODAR data for the sounding</a:t>
+            </a:r>
+          </a:p>
+          <a:p>
+            <a:r>
+              <a:rPr lang="en-US" sz="1900" dirty="0"/>
+              <a:t>Finish </a:t>
+            </a:r>
+            <a:r>
+              <a:rPr lang="en-US" sz="1900" dirty="0" err="1"/>
+              <a:t>powerpoint</a:t>
+            </a:r>
+            <a:r>
+              <a:rPr lang="en-US" sz="1900" dirty="0"/>
+              <a:t> for Jan</a:t>
+            </a:r>
+          </a:p>
+          <a:p>
+            <a:r>
+              <a:rPr lang="en-US" sz="1900" dirty="0"/>
+              <a:t>Write report on pressure sensors</a:t>
+            </a:r>
+          </a:p>
+          <a:p>
+            <a:pPr lvl="1"/>
+            <a:r>
+              <a:rPr lang="en-US" sz="1900" dirty="0"/>
+              <a:t>Waiting for final FF2 simulation before I can write the report</a:t>
+            </a:r>
+          </a:p>
+          <a:p>
+            <a:endParaRPr lang="en-US" dirty="0"/>
+          </a:p>
+        </p:txBody>
+      </p:sp>
+    </p:spTree>
+    <p:extLst>
+      <p:ext uri="{BB962C8B-B14F-4D97-AF65-F5344CB8AC3E}">
+        <p14:creationId xmlns:p14="http://schemas.microsoft.com/office/powerpoint/2010/main" val="2300117609"/>
       </p:ext>
     </p:extLst>
   </p:cSld>

</xml_diff>